<commit_message>
inital work on the presentation
</commit_message>
<xml_diff>
--- a/ex3/TODO_presentation_ex_3.pptx
+++ b/ex3/TODO_presentation_ex_3.pptx
@@ -7,7 +7,9 @@
   <p:sldIdLst>
     <p:sldId id="256" r:id="rId2"/>
     <p:sldId id="257" r:id="rId3"/>
-    <p:sldId id="258" r:id="rId4"/>
+    <p:sldId id="259" r:id="rId4"/>
+    <p:sldId id="258" r:id="rId5"/>
+    <p:sldId id="260" r:id="rId6"/>
   </p:sldIdLst>
   <p:sldSz cx="12192000" cy="6858000"/>
   <p:notesSz cx="6858000" cy="9144000"/>
@@ -127,7 +129,7 @@
   <pc:docChgLst>
     <pc:chgData name="Haubenburger, Gabriel" userId="d79be2aa-0303-4748-b5e6-c8202455e92e" providerId="ADAL" clId="{2E67A716-531E-42DB-A1FD-7665D808FD07}"/>
     <pc:docChg chg="undo custSel addSld delSld modSld">
-      <pc:chgData name="Haubenburger, Gabriel" userId="d79be2aa-0303-4748-b5e6-c8202455e92e" providerId="ADAL" clId="{2E67A716-531E-42DB-A1FD-7665D808FD07}" dt="2025-02-25T11:09:44.947" v="63" actId="20577"/>
+      <pc:chgData name="Haubenburger, Gabriel" userId="d79be2aa-0303-4748-b5e6-c8202455e92e" providerId="ADAL" clId="{2E67A716-531E-42DB-A1FD-7665D808FD07}" dt="2025-02-25T15:22:51.772" v="1606" actId="20577"/>
       <pc:docMkLst>
         <pc:docMk/>
       </pc:docMkLst>
@@ -155,13 +157,13 @@
         </pc:spChg>
       </pc:sldChg>
       <pc:sldChg chg="modSp new mod">
-        <pc:chgData name="Haubenburger, Gabriel" userId="d79be2aa-0303-4748-b5e6-c8202455e92e" providerId="ADAL" clId="{2E67A716-531E-42DB-A1FD-7665D808FD07}" dt="2025-02-25T11:09:15.151" v="48"/>
+        <pc:chgData name="Haubenburger, Gabriel" userId="d79be2aa-0303-4748-b5e6-c8202455e92e" providerId="ADAL" clId="{2E67A716-531E-42DB-A1FD-7665D808FD07}" dt="2025-02-25T15:22:51.772" v="1606" actId="20577"/>
         <pc:sldMkLst>
           <pc:docMk/>
           <pc:sldMk cId="2717143054" sldId="257"/>
         </pc:sldMkLst>
         <pc:spChg chg="mod">
-          <ac:chgData name="Haubenburger, Gabriel" userId="d79be2aa-0303-4748-b5e6-c8202455e92e" providerId="ADAL" clId="{2E67A716-531E-42DB-A1FD-7665D808FD07}" dt="2025-02-25T11:09:15.151" v="48"/>
+          <ac:chgData name="Haubenburger, Gabriel" userId="d79be2aa-0303-4748-b5e6-c8202455e92e" providerId="ADAL" clId="{2E67A716-531E-42DB-A1FD-7665D808FD07}" dt="2025-02-25T15:18:33.393" v="1420" actId="20577"/>
           <ac:spMkLst>
             <pc:docMk/>
             <pc:sldMk cId="2717143054" sldId="257"/>
@@ -169,7 +171,7 @@
           </ac:spMkLst>
         </pc:spChg>
         <pc:spChg chg="mod">
-          <ac:chgData name="Haubenburger, Gabriel" userId="d79be2aa-0303-4748-b5e6-c8202455e92e" providerId="ADAL" clId="{2E67A716-531E-42DB-A1FD-7665D808FD07}" dt="2025-02-25T11:08:59.425" v="38" actId="20577"/>
+          <ac:chgData name="Haubenburger, Gabriel" userId="d79be2aa-0303-4748-b5e6-c8202455e92e" providerId="ADAL" clId="{2E67A716-531E-42DB-A1FD-7665D808FD07}" dt="2025-02-25T15:22:51.772" v="1606" actId="20577"/>
           <ac:spMkLst>
             <pc:docMk/>
             <pc:sldMk cId="2717143054" sldId="257"/>
@@ -224,13 +226,13 @@
         </pc:spChg>
       </pc:sldChg>
       <pc:sldChg chg="modSp new mod">
-        <pc:chgData name="Haubenburger, Gabriel" userId="d79be2aa-0303-4748-b5e6-c8202455e92e" providerId="ADAL" clId="{2E67A716-531E-42DB-A1FD-7665D808FD07}" dt="2025-02-25T11:09:44.947" v="63" actId="20577"/>
+        <pc:chgData name="Haubenburger, Gabriel" userId="d79be2aa-0303-4748-b5e6-c8202455e92e" providerId="ADAL" clId="{2E67A716-531E-42DB-A1FD-7665D808FD07}" dt="2025-02-25T15:19:12.193" v="1426" actId="20577"/>
         <pc:sldMkLst>
           <pc:docMk/>
           <pc:sldMk cId="3493682747" sldId="258"/>
         </pc:sldMkLst>
         <pc:spChg chg="mod">
-          <ac:chgData name="Haubenburger, Gabriel" userId="d79be2aa-0303-4748-b5e6-c8202455e92e" providerId="ADAL" clId="{2E67A716-531E-42DB-A1FD-7665D808FD07}" dt="2025-02-25T11:09:28.364" v="50"/>
+          <ac:chgData name="Haubenburger, Gabriel" userId="d79be2aa-0303-4748-b5e6-c8202455e92e" providerId="ADAL" clId="{2E67A716-531E-42DB-A1FD-7665D808FD07}" dt="2025-02-25T15:19:12.193" v="1426" actId="20577"/>
           <ac:spMkLst>
             <pc:docMk/>
             <pc:sldMk cId="3493682747" sldId="258"/>
@@ -238,11 +240,34 @@
           </ac:spMkLst>
         </pc:spChg>
         <pc:spChg chg="mod">
-          <ac:chgData name="Haubenburger, Gabriel" userId="d79be2aa-0303-4748-b5e6-c8202455e92e" providerId="ADAL" clId="{2E67A716-531E-42DB-A1FD-7665D808FD07}" dt="2025-02-25T11:09:44.947" v="63" actId="20577"/>
+          <ac:chgData name="Haubenburger, Gabriel" userId="d79be2aa-0303-4748-b5e6-c8202455e92e" providerId="ADAL" clId="{2E67A716-531E-42DB-A1FD-7665D808FD07}" dt="2025-02-25T15:13:58.737" v="957" actId="20577"/>
           <ac:spMkLst>
             <pc:docMk/>
             <pc:sldMk cId="3493682747" sldId="258"/>
             <ac:spMk id="3" creationId="{05A724B5-2789-13EA-8403-299B735FD91A}"/>
+          </ac:spMkLst>
+        </pc:spChg>
+      </pc:sldChg>
+      <pc:sldChg chg="modSp new mod">
+        <pc:chgData name="Haubenburger, Gabriel" userId="d79be2aa-0303-4748-b5e6-c8202455e92e" providerId="ADAL" clId="{2E67A716-531E-42DB-A1FD-7665D808FD07}" dt="2025-02-25T15:18:39.204" v="1421" actId="20577"/>
+        <pc:sldMkLst>
+          <pc:docMk/>
+          <pc:sldMk cId="614946214" sldId="259"/>
+        </pc:sldMkLst>
+        <pc:spChg chg="mod">
+          <ac:chgData name="Haubenburger, Gabriel" userId="d79be2aa-0303-4748-b5e6-c8202455e92e" providerId="ADAL" clId="{2E67A716-531E-42DB-A1FD-7665D808FD07}" dt="2025-02-25T15:18:39.204" v="1421" actId="20577"/>
+          <ac:spMkLst>
+            <pc:docMk/>
+            <pc:sldMk cId="614946214" sldId="259"/>
+            <ac:spMk id="2" creationId="{ECF09746-FBFD-B09A-1E71-81A7BCCBCA2B}"/>
+          </ac:spMkLst>
+        </pc:spChg>
+        <pc:spChg chg="mod">
+          <ac:chgData name="Haubenburger, Gabriel" userId="d79be2aa-0303-4748-b5e6-c8202455e92e" providerId="ADAL" clId="{2E67A716-531E-42DB-A1FD-7665D808FD07}" dt="2025-02-25T15:17:34.445" v="1326" actId="20577"/>
+          <ac:spMkLst>
+            <pc:docMk/>
+            <pc:sldMk cId="614946214" sldId="259"/>
+            <ac:spMk id="3" creationId="{49DAF316-A5ED-3FC0-8B28-64F8EA5BCC89}"/>
           </ac:spMkLst>
         </pc:spChg>
       </pc:sldChg>
@@ -266,6 +291,29 @@
             <pc:docMk/>
             <pc:sldMk cId="4244075057" sldId="259"/>
             <ac:spMk id="3" creationId="{BC38231A-ECB4-0153-0411-F74632AD3135}"/>
+          </ac:spMkLst>
+        </pc:spChg>
+      </pc:sldChg>
+      <pc:sldChg chg="modSp new mod">
+        <pc:chgData name="Haubenburger, Gabriel" userId="d79be2aa-0303-4748-b5e6-c8202455e92e" providerId="ADAL" clId="{2E67A716-531E-42DB-A1FD-7665D808FD07}" dt="2025-02-25T15:19:14.279" v="1427" actId="20577"/>
+        <pc:sldMkLst>
+          <pc:docMk/>
+          <pc:sldMk cId="1507360320" sldId="260"/>
+        </pc:sldMkLst>
+        <pc:spChg chg="mod">
+          <ac:chgData name="Haubenburger, Gabriel" userId="d79be2aa-0303-4748-b5e6-c8202455e92e" providerId="ADAL" clId="{2E67A716-531E-42DB-A1FD-7665D808FD07}" dt="2025-02-25T15:19:14.279" v="1427" actId="20577"/>
+          <ac:spMkLst>
+            <pc:docMk/>
+            <pc:sldMk cId="1507360320" sldId="260"/>
+            <ac:spMk id="2" creationId="{ACA7BED9-4410-3B83-483C-34B0F5E26229}"/>
+          </ac:spMkLst>
+        </pc:spChg>
+        <pc:spChg chg="mod">
+          <ac:chgData name="Haubenburger, Gabriel" userId="d79be2aa-0303-4748-b5e6-c8202455e92e" providerId="ADAL" clId="{2E67A716-531E-42DB-A1FD-7665D808FD07}" dt="2025-02-25T15:02:44.517" v="629" actId="33524"/>
+          <ac:spMkLst>
+            <pc:docMk/>
+            <pc:sldMk cId="1507360320" sldId="260"/>
+            <ac:spMk id="3" creationId="{CF9B3F37-DA47-3C84-DC87-26A8679AF768}"/>
           </ac:spMkLst>
         </pc:spChg>
       </pc:sldChg>
@@ -3948,7 +3996,7 @@
           <a:p>
             <a:r>
               <a:rPr lang="de-DE" dirty="0"/>
-              <a:t>Tackling SA –</a:t>
+              <a:t>Tackling SA – </a:t>
             </a:r>
             <a:r>
               <a:rPr lang="de-DE" dirty="0" err="1"/>
@@ -4001,22 +4049,43 @@
             </a:r>
           </a:p>
           <a:p>
+            <a:pPr lvl="1"/>
+            <a:r>
+              <a:rPr lang="en-US" dirty="0"/>
+              <a:t>A solution is a selection of a classifier together with hyperparameters</a:t>
+            </a:r>
+          </a:p>
+          <a:p>
+            <a:pPr lvl="1"/>
+            <a:r>
+              <a:rPr lang="en-US" dirty="0"/>
+              <a:t>Can be represented as vector in [0, 1)^(n+1)</a:t>
+            </a:r>
+          </a:p>
+          <a:p>
+            <a:pPr lvl="1"/>
+            <a:r>
+              <a:rPr lang="en-US" dirty="0"/>
+              <a:t>n is the maximum number of hyperparameters for all of our classifiers</a:t>
+            </a:r>
+          </a:p>
+          <a:p>
             <a:r>
               <a:rPr lang="en-US" dirty="0"/>
               <a:t>What are the neighbors of a solution?</a:t>
             </a:r>
           </a:p>
           <a:p>
+            <a:pPr lvl="1"/>
             <a:r>
               <a:rPr lang="en-US" dirty="0"/>
-              <a:t>What is a cost of a solution</a:t>
-            </a:r>
-          </a:p>
-          <a:p>
-            <a:r>
-              <a:rPr lang="en-US" dirty="0"/>
-              <a:t>How do we determine the initial solution</a:t>
-            </a:r>
+              <a:t>Want to penalize picking </a:t>
+            </a:r>
+            <a:r>
+              <a:rPr lang="en-US"/>
+              <a:t>other classifiers</a:t>
+            </a:r>
+            <a:endParaRPr lang="en-US" dirty="0"/>
           </a:p>
         </p:txBody>
       </p:sp>
@@ -4055,7 +4124,7 @@
           <p:cNvPr id="2" name="Title 1">
             <a:extLst>
               <a:ext uri="{FF2B5EF4-FFF2-40B4-BE49-F238E27FC236}">
-                <a16:creationId xmlns:a16="http://schemas.microsoft.com/office/drawing/2014/main" id="{D83C6FD5-C683-3CAD-A48C-20BC4798881F}"/>
+                <a16:creationId xmlns:a16="http://schemas.microsoft.com/office/drawing/2014/main" id="{ECF09746-FBFD-B09A-1E71-81A7BCCBCA2B}"/>
               </a:ext>
             </a:extLst>
           </p:cNvPr>
@@ -4073,7 +4142,7 @@
           <a:p>
             <a:r>
               <a:rPr lang="de-DE" dirty="0"/>
-              <a:t>Tackling SA –</a:t>
+              <a:t>Tackling SA – </a:t>
             </a:r>
             <a:r>
               <a:rPr lang="de-DE" dirty="0" err="1"/>
@@ -4095,6 +4164,18 @@
               <a:rPr lang="de-DE" dirty="0" err="1"/>
               <a:t>questions</a:t>
             </a:r>
+            <a:r>
+              <a:rPr lang="de-DE" dirty="0"/>
+              <a:t> </a:t>
+            </a:r>
+            <a:r>
+              <a:rPr lang="de-DE" dirty="0" err="1"/>
+              <a:t>cont</a:t>
+            </a:r>
+            <a:r>
+              <a:rPr lang="de-DE" dirty="0"/>
+              <a:t>.</a:t>
+            </a:r>
             <a:endParaRPr lang="en-US" dirty="0"/>
           </a:p>
         </p:txBody>
@@ -4104,6 +4185,142 @@
           <p:cNvPr id="3" name="Content Placeholder 2">
             <a:extLst>
               <a:ext uri="{FF2B5EF4-FFF2-40B4-BE49-F238E27FC236}">
+                <a16:creationId xmlns:a16="http://schemas.microsoft.com/office/drawing/2014/main" id="{49DAF316-A5ED-3FC0-8B28-64F8EA5BCC89}"/>
+              </a:ext>
+            </a:extLst>
+          </p:cNvPr>
+          <p:cNvSpPr>
+            <a:spLocks noGrp="1"/>
+          </p:cNvSpPr>
+          <p:nvPr>
+            <p:ph idx="1"/>
+          </p:nvPr>
+        </p:nvSpPr>
+        <p:spPr/>
+        <p:txBody>
+          <a:bodyPr/>
+          <a:lstStyle/>
+          <a:p>
+            <a:r>
+              <a:rPr lang="en-US" dirty="0"/>
+              <a:t>What is a cost of a solution?</a:t>
+            </a:r>
+          </a:p>
+          <a:p>
+            <a:pPr lvl="1"/>
+            <a:r>
+              <a:rPr lang="en-US" dirty="0"/>
+              <a:t>Obvious first choice is accuracy of prediction</a:t>
+            </a:r>
+          </a:p>
+          <a:p>
+            <a:pPr lvl="1"/>
+            <a:r>
+              <a:rPr lang="en-US" dirty="0"/>
+              <a:t>Scores in range [0, 1] not good for our method of choosing worse solutions</a:t>
+            </a:r>
+          </a:p>
+          <a:p>
+            <a:pPr lvl="1"/>
+            <a:r>
+              <a:rPr lang="en-US" dirty="0"/>
+              <a:t>Scaled it up by 100 to get a wider range of scores </a:t>
+            </a:r>
+          </a:p>
+          <a:p>
+            <a:r>
+              <a:rPr lang="en-US" dirty="0"/>
+              <a:t>How do we determine the initial solution?</a:t>
+            </a:r>
+          </a:p>
+          <a:p>
+            <a:pPr lvl="1"/>
+            <a:r>
+              <a:rPr lang="en-US" dirty="0"/>
+              <a:t>We simply picked randomly in entire search space</a:t>
+            </a:r>
+          </a:p>
+          <a:p>
+            <a:endParaRPr lang="en-US" dirty="0"/>
+          </a:p>
+        </p:txBody>
+      </p:sp>
+    </p:spTree>
+    <p:extLst>
+      <p:ext uri="{BB962C8B-B14F-4D97-AF65-F5344CB8AC3E}">
+        <p14:creationId xmlns:p14="http://schemas.microsoft.com/office/powerpoint/2010/main" val="614946214"/>
+      </p:ext>
+    </p:extLst>
+  </p:cSld>
+  <p:clrMapOvr>
+    <a:masterClrMapping/>
+  </p:clrMapOvr>
+</p:sld>
+</file>
+
+<file path=ppt/slides/slide4.xml><?xml version="1.0" encoding="utf-8"?>
+<p:sld xmlns:a="http://schemas.openxmlformats.org/drawingml/2006/main" xmlns:r="http://schemas.openxmlformats.org/officeDocument/2006/relationships" xmlns:p="http://schemas.openxmlformats.org/presentationml/2006/main">
+  <p:cSld>
+    <p:spTree>
+      <p:nvGrpSpPr>
+        <p:cNvPr id="1" name=""/>
+        <p:cNvGrpSpPr/>
+        <p:nvPr/>
+      </p:nvGrpSpPr>
+      <p:grpSpPr>
+        <a:xfrm>
+          <a:off x="0" y="0"/>
+          <a:ext cx="0" cy="0"/>
+          <a:chOff x="0" y="0"/>
+          <a:chExt cx="0" cy="0"/>
+        </a:xfrm>
+      </p:grpSpPr>
+      <p:sp>
+        <p:nvSpPr>
+          <p:cNvPr id="2" name="Title 1">
+            <a:extLst>
+              <a:ext uri="{FF2B5EF4-FFF2-40B4-BE49-F238E27FC236}">
+                <a16:creationId xmlns:a16="http://schemas.microsoft.com/office/drawing/2014/main" id="{D83C6FD5-C683-3CAD-A48C-20BC4798881F}"/>
+              </a:ext>
+            </a:extLst>
+          </p:cNvPr>
+          <p:cNvSpPr>
+            <a:spLocks noGrp="1"/>
+          </p:cNvSpPr>
+          <p:nvPr>
+            <p:ph type="title"/>
+          </p:nvPr>
+        </p:nvSpPr>
+        <p:spPr/>
+        <p:txBody>
+          <a:bodyPr/>
+          <a:lstStyle/>
+          <a:p>
+            <a:r>
+              <a:rPr lang="de-DE" dirty="0"/>
+              <a:t>Tackling SA – </a:t>
+            </a:r>
+            <a:r>
+              <a:rPr lang="de-DE" dirty="0" err="1"/>
+              <a:t>specific</a:t>
+            </a:r>
+            <a:r>
+              <a:rPr lang="de-DE" dirty="0"/>
+              <a:t> </a:t>
+            </a:r>
+            <a:r>
+              <a:rPr lang="de-DE" dirty="0" err="1"/>
+              <a:t>questions</a:t>
+            </a:r>
+            <a:endParaRPr lang="en-US" dirty="0"/>
+          </a:p>
+        </p:txBody>
+      </p:sp>
+      <p:sp>
+        <p:nvSpPr>
+          <p:cNvPr id="3" name="Content Placeholder 2">
+            <a:extLst>
+              <a:ext uri="{FF2B5EF4-FFF2-40B4-BE49-F238E27FC236}">
                 <a16:creationId xmlns:a16="http://schemas.microsoft.com/office/drawing/2014/main" id="{05A724B5-2789-13EA-8403-299B735FD91A}"/>
               </a:ext>
             </a:extLst>
@@ -4117,20 +4334,59 @@
         </p:nvSpPr>
         <p:spPr/>
         <p:txBody>
-          <a:bodyPr/>
+          <a:bodyPr>
+            <a:noAutofit/>
+          </a:bodyPr>
           <a:lstStyle/>
           <a:p>
             <a:r>
               <a:rPr lang="en-US" dirty="0"/>
-              <a:t>How do we determine </a:t>
-            </a:r>
-            <a:r>
-              <a:rPr lang="en-US"/>
-              <a:t>the initial </a:t>
-            </a:r>
+              <a:t>How do we determine the initial “temperature” T”?</a:t>
+            </a:r>
+          </a:p>
+          <a:p>
+            <a:pPr lvl="1"/>
             <a:r>
               <a:rPr lang="en-US" dirty="0"/>
-              <a:t>“temperature” T”</a:t>
+              <a:t>Want an initially high probability to accept worse solutions</a:t>
+            </a:r>
+          </a:p>
+          <a:p>
+            <a:pPr lvl="1"/>
+            <a:r>
+              <a:rPr lang="en-US" dirty="0"/>
+              <a:t>Based on score range and method for choosing worse solution went with T = 150</a:t>
+            </a:r>
+          </a:p>
+          <a:p>
+            <a:pPr lvl="1"/>
+            <a:r>
+              <a:rPr lang="en-US" dirty="0"/>
+              <a:t>P(</a:t>
+            </a:r>
+            <a:r>
+              <a:rPr lang="en-US" dirty="0" err="1"/>
+              <a:t>ChoseWorse</a:t>
+            </a:r>
+            <a:r>
+              <a:rPr lang="en-US" dirty="0"/>
+              <a:t>) ~ 0.7 for eval(</a:t>
+            </a:r>
+            <a:r>
+              <a:rPr lang="en-US" dirty="0" err="1"/>
+              <a:t>v_n</a:t>
+            </a:r>
+            <a:r>
+              <a:rPr lang="en-US" dirty="0"/>
+              <a:t>)-eval(</a:t>
+            </a:r>
+            <a:r>
+              <a:rPr lang="en-US" dirty="0" err="1"/>
+              <a:t>v_c</a:t>
+            </a:r>
+            <a:r>
+              <a:rPr lang="en-US" dirty="0"/>
+              <a:t>) = 50</a:t>
             </a:r>
           </a:p>
           <a:p>
@@ -4148,15 +4404,31 @@
             </a:r>
           </a:p>
           <a:p>
+            <a:pPr lvl="1"/>
             <a:r>
               <a:rPr lang="en-US" dirty="0"/>
-              <a:t>How do we determine the termination condition?</a:t>
-            </a:r>
-          </a:p>
-          <a:p>
+              <a:t>We wanted a cooling function that slowed down at lower temperatures</a:t>
+            </a:r>
+          </a:p>
+          <a:p>
+            <a:pPr lvl="1"/>
             <a:r>
               <a:rPr lang="en-US" dirty="0"/>
-              <a:t>How do we determine the halting criterion?</a:t>
+              <a:t>We ignore the time stamp</a:t>
+            </a:r>
+          </a:p>
+          <a:p>
+            <a:pPr lvl="1"/>
+            <a:r>
+              <a:rPr lang="en-US" dirty="0"/>
+              <a:t>Multiplying by a factor k &lt; 1 means same relative cooling but slower absolute cooling at lower temperatures</a:t>
+            </a:r>
+          </a:p>
+          <a:p>
+            <a:pPr lvl="1"/>
+            <a:r>
+              <a:rPr lang="en-US" dirty="0"/>
+              <a:t>Chose k = 0.9995 to reduce 150 to ~10 after ~5.5k cooling steps</a:t>
             </a:r>
           </a:p>
         </p:txBody>
@@ -4165,6 +4437,154 @@
     <p:extLst>
       <p:ext uri="{BB962C8B-B14F-4D97-AF65-F5344CB8AC3E}">
         <p14:creationId xmlns:p14="http://schemas.microsoft.com/office/powerpoint/2010/main" val="3493682747"/>
+      </p:ext>
+    </p:extLst>
+  </p:cSld>
+  <p:clrMapOvr>
+    <a:masterClrMapping/>
+  </p:clrMapOvr>
+</p:sld>
+</file>
+
+<file path=ppt/slides/slide5.xml><?xml version="1.0" encoding="utf-8"?>
+<p:sld xmlns:a="http://schemas.openxmlformats.org/drawingml/2006/main" xmlns:r="http://schemas.openxmlformats.org/officeDocument/2006/relationships" xmlns:p="http://schemas.openxmlformats.org/presentationml/2006/main">
+  <p:cSld>
+    <p:spTree>
+      <p:nvGrpSpPr>
+        <p:cNvPr id="1" name=""/>
+        <p:cNvGrpSpPr/>
+        <p:nvPr/>
+      </p:nvGrpSpPr>
+      <p:grpSpPr>
+        <a:xfrm>
+          <a:off x="0" y="0"/>
+          <a:ext cx="0" cy="0"/>
+          <a:chOff x="0" y="0"/>
+          <a:chExt cx="0" cy="0"/>
+        </a:xfrm>
+      </p:grpSpPr>
+      <p:sp>
+        <p:nvSpPr>
+          <p:cNvPr id="2" name="Title 1">
+            <a:extLst>
+              <a:ext uri="{FF2B5EF4-FFF2-40B4-BE49-F238E27FC236}">
+                <a16:creationId xmlns:a16="http://schemas.microsoft.com/office/drawing/2014/main" id="{ACA7BED9-4410-3B83-483C-34B0F5E26229}"/>
+              </a:ext>
+            </a:extLst>
+          </p:cNvPr>
+          <p:cNvSpPr>
+            <a:spLocks noGrp="1"/>
+          </p:cNvSpPr>
+          <p:nvPr>
+            <p:ph type="title"/>
+          </p:nvPr>
+        </p:nvSpPr>
+        <p:spPr/>
+        <p:txBody>
+          <a:bodyPr/>
+          <a:lstStyle/>
+          <a:p>
+            <a:r>
+              <a:rPr lang="de-DE" dirty="0"/>
+              <a:t>Tackling SA – </a:t>
+            </a:r>
+            <a:r>
+              <a:rPr lang="de-DE" dirty="0" err="1"/>
+              <a:t>specific</a:t>
+            </a:r>
+            <a:r>
+              <a:rPr lang="de-DE" dirty="0"/>
+              <a:t> </a:t>
+            </a:r>
+            <a:r>
+              <a:rPr lang="de-DE" dirty="0" err="1"/>
+              <a:t>questions</a:t>
+            </a:r>
+            <a:r>
+              <a:rPr lang="de-DE" dirty="0"/>
+              <a:t> </a:t>
+            </a:r>
+            <a:r>
+              <a:rPr lang="de-DE" dirty="0" err="1"/>
+              <a:t>cont</a:t>
+            </a:r>
+            <a:r>
+              <a:rPr lang="de-DE" dirty="0"/>
+              <a:t>.</a:t>
+            </a:r>
+            <a:endParaRPr lang="en-US" dirty="0"/>
+          </a:p>
+        </p:txBody>
+      </p:sp>
+      <p:sp>
+        <p:nvSpPr>
+          <p:cNvPr id="3" name="Content Placeholder 2">
+            <a:extLst>
+              <a:ext uri="{FF2B5EF4-FFF2-40B4-BE49-F238E27FC236}">
+                <a16:creationId xmlns:a16="http://schemas.microsoft.com/office/drawing/2014/main" id="{CF9B3F37-DA47-3C84-DC87-26A8679AF768}"/>
+              </a:ext>
+            </a:extLst>
+          </p:cNvPr>
+          <p:cNvSpPr>
+            <a:spLocks noGrp="1"/>
+          </p:cNvSpPr>
+          <p:nvPr>
+            <p:ph idx="1"/>
+          </p:nvPr>
+        </p:nvSpPr>
+        <p:spPr/>
+        <p:txBody>
+          <a:bodyPr/>
+          <a:lstStyle/>
+          <a:p>
+            <a:r>
+              <a:rPr lang="en-US" dirty="0"/>
+              <a:t>How do we determine the termination condition?</a:t>
+            </a:r>
+          </a:p>
+          <a:p>
+            <a:pPr lvl="1"/>
+            <a:r>
+              <a:rPr lang="en-US" dirty="0"/>
+              <a:t>Simple method: a certain number of iterations have concluded</a:t>
+            </a:r>
+          </a:p>
+          <a:p>
+            <a:pPr lvl="1"/>
+            <a:r>
+              <a:rPr lang="en-US" dirty="0"/>
+              <a:t>We chose 10 iterations</a:t>
+            </a:r>
+          </a:p>
+          <a:p>
+            <a:r>
+              <a:rPr lang="en-US" dirty="0"/>
+              <a:t>How do we determine the halting criterion?</a:t>
+            </a:r>
+          </a:p>
+          <a:p>
+            <a:pPr lvl="1"/>
+            <a:r>
+              <a:rPr lang="en-US" dirty="0"/>
+              <a:t>Want the algorithm to run at least an hour</a:t>
+            </a:r>
+          </a:p>
+          <a:p>
+            <a:pPr lvl="1"/>
+            <a:r>
+              <a:rPr lang="en-US" dirty="0"/>
+              <a:t>Terminate once that hour has passed</a:t>
+            </a:r>
+          </a:p>
+          <a:p>
+            <a:endParaRPr lang="en-US" dirty="0"/>
+          </a:p>
+        </p:txBody>
+      </p:sp>
+    </p:spTree>
+    <p:extLst>
+      <p:ext uri="{BB962C8B-B14F-4D97-AF65-F5344CB8AC3E}">
+        <p14:creationId xmlns:p14="http://schemas.microsoft.com/office/powerpoint/2010/main" val="1507360320"/>
       </p:ext>
     </p:extLst>
   </p:cSld>

</xml_diff>

<commit_message>
towards a better neighbor selection
</commit_message>
<xml_diff>
--- a/ex3/TODO_presentation_ex_3.pptx
+++ b/ex3/TODO_presentation_ex_3.pptx
@@ -129,7 +129,7 @@
   <pc:docChgLst>
     <pc:chgData name="Haubenburger, Gabriel" userId="d79be2aa-0303-4748-b5e6-c8202455e92e" providerId="ADAL" clId="{2E67A716-531E-42DB-A1FD-7665D808FD07}"/>
     <pc:docChg chg="undo custSel addSld delSld modSld">
-      <pc:chgData name="Haubenburger, Gabriel" userId="d79be2aa-0303-4748-b5e6-c8202455e92e" providerId="ADAL" clId="{2E67A716-531E-42DB-A1FD-7665D808FD07}" dt="2025-02-25T15:22:51.772" v="1606" actId="20577"/>
+      <pc:chgData name="Haubenburger, Gabriel" userId="d79be2aa-0303-4748-b5e6-c8202455e92e" providerId="ADAL" clId="{2E67A716-531E-42DB-A1FD-7665D808FD07}" dt="2025-02-25T15:57:34.781" v="1809" actId="20577"/>
       <pc:docMkLst>
         <pc:docMk/>
       </pc:docMkLst>
@@ -157,7 +157,7 @@
         </pc:spChg>
       </pc:sldChg>
       <pc:sldChg chg="modSp new mod">
-        <pc:chgData name="Haubenburger, Gabriel" userId="d79be2aa-0303-4748-b5e6-c8202455e92e" providerId="ADAL" clId="{2E67A716-531E-42DB-A1FD-7665D808FD07}" dt="2025-02-25T15:22:51.772" v="1606" actId="20577"/>
+        <pc:chgData name="Haubenburger, Gabriel" userId="d79be2aa-0303-4748-b5e6-c8202455e92e" providerId="ADAL" clId="{2E67A716-531E-42DB-A1FD-7665D808FD07}" dt="2025-02-25T15:54:56.384" v="1770" actId="20577"/>
         <pc:sldMkLst>
           <pc:docMk/>
           <pc:sldMk cId="2717143054" sldId="257"/>
@@ -171,7 +171,7 @@
           </ac:spMkLst>
         </pc:spChg>
         <pc:spChg chg="mod">
-          <ac:chgData name="Haubenburger, Gabriel" userId="d79be2aa-0303-4748-b5e6-c8202455e92e" providerId="ADAL" clId="{2E67A716-531E-42DB-A1FD-7665D808FD07}" dt="2025-02-25T15:22:51.772" v="1606" actId="20577"/>
+          <ac:chgData name="Haubenburger, Gabriel" userId="d79be2aa-0303-4748-b5e6-c8202455e92e" providerId="ADAL" clId="{2E67A716-531E-42DB-A1FD-7665D808FD07}" dt="2025-02-25T15:54:56.384" v="1770" actId="20577"/>
           <ac:spMkLst>
             <pc:docMk/>
             <pc:sldMk cId="2717143054" sldId="257"/>
@@ -226,7 +226,7 @@
         </pc:spChg>
       </pc:sldChg>
       <pc:sldChg chg="modSp new mod">
-        <pc:chgData name="Haubenburger, Gabriel" userId="d79be2aa-0303-4748-b5e6-c8202455e92e" providerId="ADAL" clId="{2E67A716-531E-42DB-A1FD-7665D808FD07}" dt="2025-02-25T15:19:12.193" v="1426" actId="20577"/>
+        <pc:chgData name="Haubenburger, Gabriel" userId="d79be2aa-0303-4748-b5e6-c8202455e92e" providerId="ADAL" clId="{2E67A716-531E-42DB-A1FD-7665D808FD07}" dt="2025-02-25T15:57:34.781" v="1809" actId="20577"/>
         <pc:sldMkLst>
           <pc:docMk/>
           <pc:sldMk cId="3493682747" sldId="258"/>
@@ -240,7 +240,7 @@
           </ac:spMkLst>
         </pc:spChg>
         <pc:spChg chg="mod">
-          <ac:chgData name="Haubenburger, Gabriel" userId="d79be2aa-0303-4748-b5e6-c8202455e92e" providerId="ADAL" clId="{2E67A716-531E-42DB-A1FD-7665D808FD07}" dt="2025-02-25T15:13:58.737" v="957" actId="20577"/>
+          <ac:chgData name="Haubenburger, Gabriel" userId="d79be2aa-0303-4748-b5e6-c8202455e92e" providerId="ADAL" clId="{2E67A716-531E-42DB-A1FD-7665D808FD07}" dt="2025-02-25T15:57:34.781" v="1809" actId="20577"/>
           <ac:spMkLst>
             <pc:docMk/>
             <pc:sldMk cId="3493682747" sldId="258"/>
@@ -4070,6 +4070,18 @@
             </a:r>
           </a:p>
           <a:p>
+            <a:pPr lvl="1"/>
+            <a:r>
+              <a:rPr lang="en-US" dirty="0"/>
+              <a:t>Can then multiply coordinate by number of different settings for the given hyperparameter and round down to get </a:t>
+            </a:r>
+            <a:r>
+              <a:rPr lang="en-US"/>
+              <a:t>an index</a:t>
+            </a:r>
+            <a:endParaRPr lang="en-US" dirty="0"/>
+          </a:p>
+          <a:p>
             <a:r>
               <a:rPr lang="en-US" dirty="0"/>
               <a:t>What are the neighbors of a solution?</a:t>
@@ -4079,13 +4091,8 @@
             <a:pPr lvl="1"/>
             <a:r>
               <a:rPr lang="en-US" dirty="0"/>
-              <a:t>Want to penalize picking </a:t>
-            </a:r>
-            <a:r>
-              <a:rPr lang="en-US"/>
-              <a:t>other classifiers</a:t>
-            </a:r>
-            <a:endParaRPr lang="en-US" dirty="0"/>
+              <a:t>Want to penalize picking other classifiers</a:t>
+            </a:r>
           </a:p>
         </p:txBody>
       </p:sp>
@@ -4335,7 +4342,7 @@
         <p:spPr/>
         <p:txBody>
           <a:bodyPr>
-            <a:noAutofit/>
+            <a:normAutofit lnSpcReduction="10000"/>
           </a:bodyPr>
           <a:lstStyle/>
           <a:p>
@@ -4430,6 +4437,14 @@
               <a:rPr lang="en-US" dirty="0"/>
               <a:t>Chose k = 0.9995 to reduce 150 to ~10 after ~5.5k cooling steps</a:t>
             </a:r>
+          </a:p>
+          <a:p>
+            <a:pPr lvl="1"/>
+            <a:r>
+              <a:rPr lang="en-US"/>
+              <a:t>Reheat to 100 once T drops below 10</a:t>
+            </a:r>
+            <a:endParaRPr lang="en-US" dirty="0"/>
           </a:p>
         </p:txBody>
       </p:sp>

</xml_diff>